<commit_message>
Seminar2 slide about Singleton pattern.
</commit_message>
<xml_diff>
--- a/Seminar2_slide.pptx
+++ b/Seminar2_slide.pptx
@@ -203,7 +203,7 @@
           <a:p>
             <a:fld id="{D7E529F8-1901-47DF-8792-6A980B2A4952}" type="datetimeFigureOut">
               <a:rPr kumimoji="1" lang="ja-JP" altLang="en-US" smtClean="0"/>
-              <a:t>2012/11/15</a:t>
+              <a:t>2012/11/22</a:t>
             </a:fld>
             <a:endParaRPr kumimoji="1" lang="ja-JP" altLang="en-US"/>
           </a:p>
@@ -4954,7 +4954,11 @@
             <a:pPr lvl="1"/>
             <a:r>
               <a:rPr kumimoji="1" lang="ja-JP" altLang="en-US" dirty="0" smtClean="0"/>
-              <a:t>インスタンスの数に制限を設けるため。</a:t>
+              <a:t>インスタンスの数に制限を設ける</a:t>
+            </a:r>
+            <a:r>
+              <a:rPr kumimoji="1" lang="ja-JP" altLang="en-US" dirty="0" smtClean="0"/>
+              <a:t>ため</a:t>
             </a:r>
             <a:endParaRPr kumimoji="1" lang="en-US" altLang="ja-JP" dirty="0" smtClean="0"/>
           </a:p>
@@ -4970,7 +4974,11 @@
             </a:r>
             <a:r>
               <a:rPr lang="ja-JP" altLang="en-US" dirty="0" smtClean="0"/>
-              <a:t>発生を防ぐ。</a:t>
+              <a:t>発生を</a:t>
+            </a:r>
+            <a:r>
+              <a:rPr lang="ja-JP" altLang="en-US" dirty="0" smtClean="0"/>
+              <a:t>防ぐ</a:t>
             </a:r>
             <a:endParaRPr kumimoji="1" lang="en-US" altLang="ja-JP" dirty="0" smtClean="0"/>
           </a:p>
@@ -4978,7 +4986,11 @@
             <a:pPr lvl="1"/>
             <a:r>
               <a:rPr lang="ja-JP" altLang="en-US" dirty="0" smtClean="0"/>
-              <a:t>前提になる条件を増やすため。</a:t>
+              <a:t>前提になる条件を増やす</a:t>
+            </a:r>
+            <a:r>
+              <a:rPr lang="ja-JP" altLang="en-US" dirty="0" smtClean="0"/>
+              <a:t>ため</a:t>
             </a:r>
             <a:endParaRPr lang="en-US" altLang="ja-JP" dirty="0" smtClean="0"/>
           </a:p>
@@ -4994,7 +5006,11 @@
             </a:r>
             <a:r>
               <a:rPr kumimoji="1" lang="ja-JP" altLang="en-US" dirty="0" smtClean="0"/>
-              <a:t>つしかないという保証の下でプログラミングができる。</a:t>
+              <a:t>つしかないという保証の下でプログラミングが</a:t>
+            </a:r>
+            <a:r>
+              <a:rPr kumimoji="1" lang="ja-JP" altLang="en-US" dirty="0" smtClean="0"/>
+              <a:t>できる</a:t>
             </a:r>
             <a:endParaRPr kumimoji="1" lang="en-US" altLang="ja-JP" dirty="0" smtClean="0"/>
           </a:p>
@@ -5276,11 +5292,7 @@
             </a:r>
             <a:r>
               <a:rPr kumimoji="1" lang="ja-JP" altLang="en-US" dirty="0" smtClean="0"/>
-              <a:t>パターン使用の</a:t>
-            </a:r>
-            <a:r>
-              <a:rPr kumimoji="1" lang="ja-JP" altLang="en-US" dirty="0" smtClean="0"/>
-              <a:t>利点</a:t>
+              <a:t>パターン使用の利点</a:t>
             </a:r>
             <a:endParaRPr kumimoji="1" lang="ja-JP" altLang="en-US" dirty="0"/>
           </a:p>
@@ -5334,24 +5346,26 @@
             </a:r>
             <a:r>
               <a:rPr lang="ja-JP" altLang="en-US" dirty="0" smtClean="0"/>
-              <a:t>は</a:t>
+              <a:t>は可視性が</a:t>
             </a:r>
             <a:r>
               <a:rPr lang="en-US" altLang="ja-JP" dirty="0" smtClean="0"/>
               <a:t>public</a:t>
             </a:r>
             <a:r>
+              <a:rPr lang="ja-JP" altLang="en-US" dirty="0"/>
+              <a:t>の</a:t>
+            </a:r>
+            <a:r>
               <a:rPr lang="ja-JP" altLang="en-US" dirty="0" smtClean="0"/>
-              <a:t>なクラスメソッドなのでどこからでもアクセス</a:t>
-            </a:r>
-            <a:r>
-              <a:rPr lang="ja-JP" altLang="en-US" smtClean="0"/>
-              <a:t>可能で共通のインスタンス</a:t>
-            </a:r>
-            <a:r>
-              <a:rPr lang="ja-JP" altLang="en-US" dirty="0" smtClean="0"/>
-              <a:t>を得ることができる</a:t>
-            </a:r>
+              <a:t>クラスメソッド</a:t>
+            </a:r>
+            <a:endParaRPr lang="en-US" altLang="ja-JP" dirty="0" smtClean="0"/>
+          </a:p>
+          <a:p>
+            <a:pPr marL="411480" lvl="1" indent="0">
+              <a:buNone/>
+            </a:pPr>
             <a:endParaRPr lang="en-US" altLang="ja-JP" dirty="0" smtClean="0"/>
           </a:p>
         </p:txBody>
@@ -5379,6 +5393,104 @@
           </a:p>
         </p:txBody>
       </p:sp>
+      <p:grpSp>
+        <p:nvGrpSpPr>
+          <p:cNvPr id="9" name="グループ化 8"/>
+          <p:cNvGrpSpPr/>
+          <p:nvPr/>
+        </p:nvGrpSpPr>
+        <p:grpSpPr>
+          <a:xfrm>
+            <a:off x="971600" y="3111932"/>
+            <a:ext cx="6552728" cy="707886"/>
+            <a:chOff x="1043608" y="3831141"/>
+            <a:chExt cx="6552728" cy="707886"/>
+          </a:xfrm>
+        </p:grpSpPr>
+        <p:sp>
+          <p:nvSpPr>
+            <p:cNvPr id="6" name="右矢印 5"/>
+            <p:cNvSpPr/>
+            <p:nvPr/>
+          </p:nvSpPr>
+          <p:spPr>
+            <a:xfrm>
+              <a:off x="1043608" y="4005064"/>
+              <a:ext cx="576064" cy="360040"/>
+            </a:xfrm>
+            <a:prstGeom prst="rightArrow">
+              <a:avLst/>
+            </a:prstGeom>
+            <a:solidFill>
+              <a:srgbClr val="FF0066"/>
+            </a:solidFill>
+            <a:ln>
+              <a:solidFill>
+                <a:schemeClr val="accent6">
+                  <a:lumMod val="50000"/>
+                </a:schemeClr>
+              </a:solidFill>
+            </a:ln>
+          </p:spPr>
+          <p:style>
+            <a:lnRef idx="2">
+              <a:schemeClr val="accent1">
+                <a:shade val="50000"/>
+              </a:schemeClr>
+            </a:lnRef>
+            <a:fillRef idx="1">
+              <a:schemeClr val="accent1"/>
+            </a:fillRef>
+            <a:effectRef idx="0">
+              <a:schemeClr val="accent1"/>
+            </a:effectRef>
+            <a:fontRef idx="minor">
+              <a:schemeClr val="lt1"/>
+            </a:fontRef>
+          </p:style>
+          <p:txBody>
+            <a:bodyPr rtlCol="0" anchor="ctr"/>
+            <a:lstStyle/>
+            <a:p>
+              <a:pPr algn="ctr"/>
+              <a:endParaRPr kumimoji="1" lang="ja-JP" altLang="en-US"/>
+            </a:p>
+          </p:txBody>
+        </p:sp>
+        <p:sp>
+          <p:nvSpPr>
+            <p:cNvPr id="7" name="テキスト ボックス 6"/>
+            <p:cNvSpPr txBox="1"/>
+            <p:nvPr/>
+          </p:nvSpPr>
+          <p:spPr>
+            <a:xfrm>
+              <a:off x="1259632" y="3831141"/>
+              <a:ext cx="6336704" cy="707886"/>
+            </a:xfrm>
+            <a:prstGeom prst="rect">
+              <a:avLst/>
+            </a:prstGeom>
+            <a:noFill/>
+          </p:spPr>
+          <p:txBody>
+            <a:bodyPr wrap="square" rtlCol="0">
+              <a:spAutoFit/>
+            </a:bodyPr>
+            <a:lstStyle/>
+            <a:p>
+              <a:pPr marL="411480" lvl="1" indent="0">
+                <a:buNone/>
+              </a:pPr>
+              <a:r>
+                <a:rPr lang="ja-JP" altLang="en-US" sz="2000" dirty="0"/>
+                <a:t>どこからでもアクセス可能で共通のインスタンスを得ることができる</a:t>
+              </a:r>
+              <a:endParaRPr lang="en-US" altLang="ja-JP" sz="2000" dirty="0"/>
+            </a:p>
+          </p:txBody>
+        </p:sp>
+      </p:grpSp>
     </p:spTree>
     <p:extLst>
       <p:ext uri="{BB962C8B-B14F-4D97-AF65-F5344CB8AC3E}">
@@ -5550,7 +5662,11 @@
             </a:r>
             <a:r>
               <a:rPr lang="ja-JP" altLang="en-US" sz="2200" dirty="0" smtClean="0"/>
-              <a:t>いう場合に用いるパターン。</a:t>
+              <a:t>いう場合に用いる</a:t>
+            </a:r>
+            <a:r>
+              <a:rPr lang="ja-JP" altLang="en-US" sz="2200" dirty="0" smtClean="0"/>
+              <a:t>パターン</a:t>
             </a:r>
             <a:endParaRPr kumimoji="1" lang="en-US" altLang="ja-JP" sz="2200" dirty="0" smtClean="0"/>
           </a:p>
@@ -5565,7 +5681,11 @@
             </a:r>
             <a:r>
               <a:rPr lang="ja-JP" altLang="en-US" dirty="0" smtClean="0"/>
-              <a:t>個しか存在しないことを保証するパターン。</a:t>
+              <a:t>個しか存在しないことを保証する</a:t>
+            </a:r>
+            <a:r>
+              <a:rPr lang="ja-JP" altLang="en-US" dirty="0" smtClean="0"/>
+              <a:t>パターン</a:t>
             </a:r>
             <a:endParaRPr lang="en-US" altLang="ja-JP" dirty="0"/>
           </a:p>
@@ -5936,7 +6056,11 @@
             </a:r>
             <a:r>
               <a:rPr kumimoji="1" lang="ja-JP" altLang="en-US" dirty="0" smtClean="0"/>
-              <a:t>インスタンスを生成するプログラム。</a:t>
+              <a:t>インスタンスを生成する</a:t>
+            </a:r>
+            <a:r>
+              <a:rPr kumimoji="1" lang="ja-JP" altLang="en-US" dirty="0" smtClean="0"/>
+              <a:t>プログラム</a:t>
             </a:r>
             <a:endParaRPr lang="en-US" altLang="ja-JP" dirty="0"/>
           </a:p>
@@ -6505,7 +6629,7 @@
         <p:spPr/>
         <p:txBody>
           <a:bodyPr>
-            <a:normAutofit/>
+            <a:normAutofit lnSpcReduction="10000"/>
           </a:bodyPr>
           <a:lstStyle/>
           <a:p>
@@ -6535,7 +6659,11 @@
             </a:r>
             <a:r>
               <a:rPr lang="ja-JP" altLang="en-US" dirty="0" smtClean="0"/>
-              <a:t>作らないクラス。</a:t>
+              <a:t>作らない</a:t>
+            </a:r>
+            <a:r>
+              <a:rPr lang="ja-JP" altLang="en-US" dirty="0" smtClean="0"/>
+              <a:t>クラス</a:t>
             </a:r>
             <a:endParaRPr lang="en-US" altLang="ja-JP" dirty="0" smtClean="0"/>
           </a:p>
@@ -6550,54 +6678,50 @@
           <a:p>
             <a:pPr lvl="2"/>
             <a:r>
-              <a:rPr lang="en-US" altLang="ja-JP" dirty="0"/>
+              <a:rPr lang="en-US" altLang="ja-JP" sz="2000" dirty="0"/>
               <a:t>p</a:t>
             </a:r>
             <a:r>
-              <a:rPr lang="en-US" altLang="ja-JP" dirty="0" smtClean="0"/>
+              <a:rPr lang="en-US" altLang="ja-JP" sz="2000" dirty="0" smtClean="0"/>
               <a:t>rivate static Singleton </a:t>
             </a:r>
             <a:r>
-              <a:rPr lang="en-US" altLang="ja-JP" b="1" dirty="0" err="1" smtClean="0"/>
+              <a:rPr lang="en-US" altLang="ja-JP" sz="2000" b="1" dirty="0" err="1" smtClean="0"/>
               <a:t>singleton</a:t>
             </a:r>
-            <a:endParaRPr lang="en-US" altLang="ja-JP" b="1" dirty="0" smtClean="0"/>
+            <a:endParaRPr lang="en-US" altLang="ja-JP" sz="2000" b="1" dirty="0" smtClean="0"/>
           </a:p>
           <a:p>
             <a:pPr lvl="3"/>
             <a:r>
-              <a:rPr lang="ja-JP" altLang="en-US" dirty="0" smtClean="0"/>
+              <a:rPr lang="ja-JP" altLang="en-US" sz="1800" dirty="0" smtClean="0"/>
               <a:t>インスタンス</a:t>
             </a:r>
             <a:r>
-              <a:rPr lang="ja-JP" altLang="en-US" dirty="0"/>
-              <a:t>を示すフィールド</a:t>
-            </a:r>
-            <a:r>
-              <a:rPr lang="ja-JP" altLang="en-US" dirty="0" smtClean="0"/>
-              <a:t>。</a:t>
-            </a:r>
-            <a:endParaRPr lang="en-US" altLang="ja-JP" dirty="0" smtClean="0"/>
+              <a:rPr lang="ja-JP" altLang="en-US" sz="1800" dirty="0"/>
+              <a:t>を示す</a:t>
+            </a:r>
+            <a:r>
+              <a:rPr lang="ja-JP" altLang="en-US" sz="1800" dirty="0" smtClean="0"/>
+              <a:t>フィールド</a:t>
+            </a:r>
+            <a:endParaRPr lang="en-US" altLang="ja-JP" sz="1800" dirty="0" smtClean="0"/>
           </a:p>
           <a:p>
             <a:pPr lvl="3"/>
             <a:r>
-              <a:rPr lang="en-US" altLang="ja-JP" dirty="0" smtClean="0"/>
-              <a:t>private</a:t>
-            </a:r>
-            <a:r>
-              <a:rPr lang="ja-JP" altLang="en-US" dirty="0"/>
-              <a:t>型の</a:t>
-            </a:r>
-            <a:r>
-              <a:rPr lang="en-US" altLang="ja-JP" dirty="0" smtClean="0"/>
-              <a:t>static</a:t>
-            </a:r>
-            <a:r>
-              <a:rPr lang="ja-JP" altLang="en-US" dirty="0" smtClean="0"/>
-              <a:t>フィールドとして定義されており、別なクラスから変更を行うことはできない。</a:t>
-            </a:r>
-            <a:endParaRPr lang="en-US" altLang="ja-JP" dirty="0" smtClean="0"/>
+              <a:rPr lang="ja-JP" altLang="en-US" sz="1800" dirty="0" smtClean="0"/>
+              <a:t>別</a:t>
+            </a:r>
+            <a:r>
+              <a:rPr lang="ja-JP" altLang="en-US" sz="1800" dirty="0" smtClean="0"/>
+              <a:t>なクラスから変更を行うことは</a:t>
+            </a:r>
+            <a:r>
+              <a:rPr lang="ja-JP" altLang="en-US" sz="1800" dirty="0" smtClean="0"/>
+              <a:t>できない</a:t>
+            </a:r>
+            <a:endParaRPr lang="en-US" altLang="ja-JP" sz="1800" dirty="0" smtClean="0"/>
           </a:p>
           <a:p>
             <a:pPr lvl="1"/>
@@ -6610,43 +6734,47 @@
           <a:p>
             <a:pPr lvl="2"/>
             <a:r>
-              <a:rPr lang="en-US" altLang="ja-JP" dirty="0"/>
+              <a:rPr lang="en-US" altLang="ja-JP" sz="2000" dirty="0"/>
               <a:t>p</a:t>
             </a:r>
             <a:r>
-              <a:rPr lang="en-US" altLang="ja-JP" dirty="0" smtClean="0"/>
+              <a:rPr lang="en-US" altLang="ja-JP" sz="2000" dirty="0" smtClean="0"/>
               <a:t>rivate </a:t>
             </a:r>
             <a:r>
-              <a:rPr lang="en-US" altLang="ja-JP" b="1" dirty="0" smtClean="0"/>
+              <a:rPr lang="en-US" altLang="ja-JP" sz="2000" b="1" dirty="0" smtClean="0"/>
               <a:t>Singleton()</a:t>
             </a:r>
-            <a:endParaRPr lang="en-US" altLang="ja-JP" b="1" dirty="0"/>
+            <a:endParaRPr lang="en-US" altLang="ja-JP" sz="2000" b="1" dirty="0"/>
           </a:p>
           <a:p>
             <a:pPr lvl="3"/>
             <a:r>
-              <a:rPr lang="en-US" altLang="ja-JP" dirty="0" smtClean="0"/>
+              <a:rPr lang="en-US" altLang="ja-JP" sz="1800" dirty="0" smtClean="0"/>
               <a:t>Singleton</a:t>
             </a:r>
             <a:r>
-              <a:rPr lang="ja-JP" altLang="en-US" dirty="0" smtClean="0"/>
-              <a:t>クラスのコンストラクタ。</a:t>
-            </a:r>
-            <a:endParaRPr lang="en-US" altLang="ja-JP" dirty="0" smtClean="0"/>
+              <a:rPr lang="ja-JP" altLang="en-US" sz="1800" dirty="0" smtClean="0"/>
+              <a:t>クラスの</a:t>
+            </a:r>
+            <a:r>
+              <a:rPr lang="ja-JP" altLang="en-US" sz="1800" dirty="0" smtClean="0"/>
+              <a:t>コンストラクタ</a:t>
+            </a:r>
+            <a:endParaRPr lang="en-US" altLang="ja-JP" sz="1800" dirty="0" smtClean="0"/>
           </a:p>
           <a:p>
             <a:pPr lvl="3"/>
             <a:r>
-              <a:rPr lang="en-US" altLang="ja-JP" dirty="0" smtClean="0"/>
+              <a:rPr lang="en-US" altLang="ja-JP" sz="1800" dirty="0" smtClean="0"/>
               <a:t>Singleton</a:t>
             </a:r>
             <a:r>
-              <a:rPr lang="ja-JP" altLang="en-US" dirty="0" smtClean="0"/>
+              <a:rPr lang="ja-JP" altLang="en-US" sz="1800" dirty="0" smtClean="0"/>
               <a:t>クラスのロード時に</a:t>
             </a:r>
             <a:r>
-              <a:rPr lang="ja-JP" altLang="en-US" b="1" dirty="0" smtClean="0">
+              <a:rPr lang="ja-JP" altLang="en-US" sz="1800" b="1" dirty="0" smtClean="0">
                 <a:solidFill>
                   <a:srgbClr val="FF0066"/>
                 </a:solidFill>
@@ -6654,66 +6782,92 @@
               <a:t>一度だけ</a:t>
             </a:r>
             <a:r>
-              <a:rPr lang="ja-JP" altLang="en-US" dirty="0" smtClean="0"/>
+              <a:rPr lang="ja-JP" altLang="en-US" sz="1800" dirty="0" smtClean="0"/>
               <a:t>行われ、</a:t>
             </a:r>
             <a:r>
-              <a:rPr lang="en-US" altLang="ja-JP" dirty="0" smtClean="0"/>
+              <a:rPr lang="en-US" altLang="ja-JP" sz="1800" dirty="0" smtClean="0"/>
               <a:t>singleton</a:t>
             </a:r>
             <a:r>
-              <a:rPr lang="ja-JP" altLang="en-US" dirty="0" smtClean="0"/>
-              <a:t>が決定される。</a:t>
-            </a:r>
-            <a:endParaRPr lang="en-US" altLang="ja-JP" dirty="0" smtClean="0"/>
+              <a:rPr lang="ja-JP" altLang="en-US" sz="1800" dirty="0" smtClean="0"/>
+              <a:t>が</a:t>
+            </a:r>
+            <a:endParaRPr lang="en-US" altLang="ja-JP" sz="1800" dirty="0" smtClean="0"/>
+          </a:p>
+          <a:p>
+            <a:pPr marL="1051560" lvl="3" indent="0">
+              <a:buNone/>
+            </a:pPr>
+            <a:r>
+              <a:rPr lang="ja-JP" altLang="en-US" sz="1800" dirty="0"/>
+              <a:t>　</a:t>
+            </a:r>
+            <a:r>
+              <a:rPr lang="ja-JP" altLang="en-US" sz="1800" dirty="0" smtClean="0"/>
+              <a:t>決定される</a:t>
+            </a:r>
+            <a:endParaRPr lang="en-US" altLang="ja-JP" sz="1800" dirty="0" smtClean="0"/>
           </a:p>
           <a:p>
             <a:pPr lvl="2"/>
             <a:r>
-              <a:rPr lang="en-US" altLang="ja-JP" dirty="0"/>
+              <a:rPr lang="en-US" altLang="ja-JP" sz="2000" dirty="0"/>
               <a:t>p</a:t>
             </a:r>
             <a:r>
-              <a:rPr lang="en-US" altLang="ja-JP" dirty="0" smtClean="0"/>
+              <a:rPr lang="en-US" altLang="ja-JP" sz="2000" dirty="0" smtClean="0"/>
               <a:t>ublic static </a:t>
             </a:r>
             <a:r>
-              <a:rPr lang="en-US" altLang="ja-JP" b="1" dirty="0" err="1" smtClean="0"/>
+              <a:rPr lang="en-US" altLang="ja-JP" sz="2000" b="1" dirty="0" err="1" smtClean="0"/>
               <a:t>getInstance</a:t>
             </a:r>
             <a:r>
-              <a:rPr lang="en-US" altLang="ja-JP" b="1" dirty="0" smtClean="0"/>
+              <a:rPr lang="en-US" altLang="ja-JP" sz="2000" b="1" dirty="0" smtClean="0"/>
               <a:t>()</a:t>
             </a:r>
-            <a:endParaRPr lang="en-US" altLang="ja-JP" b="1" dirty="0"/>
+            <a:endParaRPr lang="en-US" altLang="ja-JP" sz="2000" b="1" dirty="0"/>
           </a:p>
           <a:p>
             <a:pPr lvl="3"/>
             <a:r>
-              <a:rPr lang="ja-JP" altLang="en-US" dirty="0" smtClean="0"/>
+              <a:rPr lang="ja-JP" altLang="en-US" sz="1800" dirty="0" smtClean="0"/>
               <a:t>コンストラクタで決定した</a:t>
             </a:r>
             <a:r>
-              <a:rPr lang="en-US" altLang="ja-JP" dirty="0" smtClean="0"/>
+              <a:rPr lang="en-US" altLang="ja-JP" sz="1800" dirty="0" smtClean="0"/>
               <a:t>singleton</a:t>
             </a:r>
             <a:r>
-              <a:rPr lang="ja-JP" altLang="en-US" dirty="0" smtClean="0"/>
-              <a:t>を取得するメソッド。</a:t>
-            </a:r>
-            <a:endParaRPr lang="en-US" altLang="ja-JP" dirty="0" smtClean="0"/>
+              <a:rPr lang="ja-JP" altLang="en-US" sz="1800" dirty="0" smtClean="0"/>
+              <a:t>を取得する</a:t>
+            </a:r>
+            <a:r>
+              <a:rPr lang="ja-JP" altLang="en-US" sz="1800" dirty="0" smtClean="0"/>
+              <a:t>メソッド</a:t>
+            </a:r>
+            <a:endParaRPr lang="en-US" altLang="ja-JP" sz="1800" dirty="0" smtClean="0"/>
           </a:p>
           <a:p>
             <a:pPr lvl="3"/>
             <a:r>
-              <a:rPr lang="ja-JP" altLang="en-US" b="1" dirty="0" smtClean="0">
+              <a:rPr lang="ja-JP" altLang="en-US" sz="1800" b="1" dirty="0" smtClean="0">
                 <a:solidFill>
                   <a:srgbClr val="FF0066"/>
                 </a:solidFill>
               </a:rPr>
-              <a:t>いつも同じインスタンスを返す。</a:t>
-            </a:r>
-            <a:endParaRPr lang="en-US" altLang="ja-JP" b="1" dirty="0" smtClean="0">
+              <a:t>いつも同じインスタンスを</a:t>
+            </a:r>
+            <a:r>
+              <a:rPr lang="ja-JP" altLang="en-US" sz="1800" b="1" dirty="0" smtClean="0">
+                <a:solidFill>
+                  <a:srgbClr val="FF0066"/>
+                </a:solidFill>
+              </a:rPr>
+              <a:t>返す</a:t>
+            </a:r>
+            <a:endParaRPr lang="en-US" altLang="ja-JP" sz="1800" b="1" dirty="0" smtClean="0">
               <a:solidFill>
                 <a:srgbClr val="FF0066"/>
               </a:solidFill>
@@ -6833,7 +6987,11 @@
             <a:pPr lvl="1"/>
             <a:r>
               <a:rPr lang="ja-JP" altLang="en-US" dirty="0" smtClean="0"/>
-              <a:t>動作テスト用のクラス。</a:t>
+              <a:t>動作テスト用の</a:t>
+            </a:r>
+            <a:r>
+              <a:rPr lang="ja-JP" altLang="en-US" dirty="0" smtClean="0"/>
+              <a:t>クラス</a:t>
             </a:r>
             <a:endParaRPr lang="en-US" altLang="ja-JP" dirty="0" smtClean="0"/>
           </a:p>
@@ -6848,79 +7006,87 @@
           <a:p>
             <a:pPr lvl="2"/>
             <a:r>
-              <a:rPr lang="en-US" altLang="ja-JP" dirty="0" smtClean="0"/>
+              <a:rPr lang="en-US" altLang="ja-JP" sz="2000" dirty="0" smtClean="0"/>
               <a:t>Singleton </a:t>
             </a:r>
             <a:r>
-              <a:rPr lang="en-US" altLang="ja-JP" b="1" dirty="0" smtClean="0"/>
+              <a:rPr lang="en-US" altLang="ja-JP" sz="2000" b="1" dirty="0" smtClean="0"/>
               <a:t>obj1</a:t>
             </a:r>
-            <a:endParaRPr lang="en-US" altLang="ja-JP" b="1" dirty="0"/>
+            <a:endParaRPr lang="en-US" altLang="ja-JP" sz="2000" b="1" dirty="0"/>
           </a:p>
           <a:p>
             <a:pPr lvl="3"/>
             <a:r>
-              <a:rPr lang="en-US" altLang="ja-JP" dirty="0"/>
+              <a:rPr lang="en-US" altLang="ja-JP" sz="1800" dirty="0"/>
               <a:t>S</a:t>
             </a:r>
             <a:r>
-              <a:rPr lang="en-US" altLang="ja-JP" dirty="0" smtClean="0"/>
+              <a:rPr lang="en-US" altLang="ja-JP" sz="1800" dirty="0" smtClean="0"/>
               <a:t>ingleton</a:t>
             </a:r>
             <a:r>
-              <a:rPr lang="ja-JP" altLang="en-US" dirty="0" smtClean="0"/>
+              <a:rPr lang="ja-JP" altLang="en-US" sz="1800" dirty="0" smtClean="0"/>
               <a:t>クラスの</a:t>
             </a:r>
             <a:r>
-              <a:rPr lang="en-US" altLang="ja-JP" dirty="0" err="1" smtClean="0"/>
+              <a:rPr lang="en-US" altLang="ja-JP" sz="1800" dirty="0" err="1" smtClean="0"/>
               <a:t>getInstance</a:t>
             </a:r>
             <a:r>
-              <a:rPr lang="ja-JP" altLang="en-US" dirty="0" smtClean="0"/>
-              <a:t>メソッドによりインスタンスが格納される。</a:t>
-            </a:r>
-            <a:endParaRPr lang="en-US" altLang="ja-JP" dirty="0" smtClean="0"/>
+              <a:rPr lang="ja-JP" altLang="en-US" sz="1800" dirty="0" smtClean="0"/>
+              <a:t>メソッドによりインスタンスが格納</a:t>
+            </a:r>
+            <a:r>
+              <a:rPr lang="ja-JP" altLang="en-US" sz="1800" dirty="0" smtClean="0"/>
+              <a:t>される</a:t>
+            </a:r>
+            <a:endParaRPr lang="en-US" altLang="ja-JP" sz="1800" dirty="0" smtClean="0"/>
           </a:p>
           <a:p>
             <a:pPr lvl="2"/>
             <a:r>
-              <a:rPr lang="en-US" altLang="ja-JP" dirty="0" smtClean="0"/>
+              <a:rPr lang="en-US" altLang="ja-JP" sz="2000" dirty="0" smtClean="0"/>
               <a:t>Singleton </a:t>
             </a:r>
             <a:r>
-              <a:rPr lang="en-US" altLang="ja-JP" b="1" dirty="0" smtClean="0"/>
+              <a:rPr lang="en-US" altLang="ja-JP" sz="2000" b="1" dirty="0" smtClean="0"/>
               <a:t>o</a:t>
             </a:r>
             <a:r>
-              <a:rPr kumimoji="1" lang="en-US" altLang="ja-JP" b="1" dirty="0" smtClean="0"/>
+              <a:rPr kumimoji="1" lang="en-US" altLang="ja-JP" sz="2000" b="1" dirty="0" smtClean="0"/>
               <a:t>bj2</a:t>
             </a:r>
-            <a:endParaRPr lang="en-US" altLang="ja-JP" b="1" dirty="0"/>
+            <a:endParaRPr lang="en-US" altLang="ja-JP" sz="2000" b="1" dirty="0"/>
           </a:p>
           <a:p>
             <a:pPr lvl="3"/>
             <a:r>
-              <a:rPr lang="en-US" altLang="ja-JP" dirty="0" smtClean="0"/>
+              <a:rPr lang="en-US" altLang="ja-JP" sz="1800" dirty="0" smtClean="0"/>
               <a:t>obj1</a:t>
             </a:r>
             <a:r>
-              <a:rPr lang="ja-JP" altLang="en-US" dirty="0" smtClean="0"/>
-              <a:t>と同じ役割を担うフィールド。</a:t>
-            </a:r>
-            <a:endParaRPr lang="en-US" altLang="ja-JP" dirty="0" smtClean="0"/>
+              <a:rPr lang="ja-JP" altLang="en-US" sz="1800" dirty="0" smtClean="0"/>
+              <a:t>と同じ役割を担う</a:t>
+            </a:r>
+            <a:r>
+              <a:rPr lang="ja-JP" altLang="en-US" sz="1800" dirty="0" smtClean="0"/>
+              <a:t>フィールド</a:t>
+            </a:r>
+            <a:endParaRPr lang="en-US" altLang="ja-JP" sz="1800" dirty="0" smtClean="0"/>
           </a:p>
           <a:p>
             <a:pPr lvl="3"/>
             <a:r>
-              <a:rPr lang="en-US" altLang="ja-JP" dirty="0" smtClean="0"/>
+              <a:rPr lang="en-US" altLang="ja-JP" sz="1800" dirty="0" smtClean="0"/>
               <a:t>obj1</a:t>
             </a:r>
             <a:r>
-              <a:rPr lang="ja-JP" altLang="en-US" dirty="0" smtClean="0"/>
+              <a:rPr lang="ja-JP" altLang="en-US" sz="1800" dirty="0" smtClean="0"/>
               <a:t>をインスタンス化した際に</a:t>
             </a:r>
             <a:r>
-              <a:rPr lang="ja-JP" altLang="en-US" b="1" dirty="0" smtClean="0">
+              <a:rPr lang="ja-JP" altLang="en-US" sz="1800" b="1" dirty="0" smtClean="0">
                 <a:solidFill>
                   <a:srgbClr val="FF0066"/>
                 </a:solidFill>
@@ -6928,7 +7094,7 @@
               <a:t>コンストラクタによって</a:t>
             </a:r>
             <a:r>
-              <a:rPr lang="en-US" altLang="ja-JP" b="1" dirty="0" smtClean="0">
+              <a:rPr lang="en-US" altLang="ja-JP" sz="1800" b="1" dirty="0" smtClean="0">
                 <a:solidFill>
                   <a:srgbClr val="FF0066"/>
                 </a:solidFill>
@@ -6936,14 +7102,70 @@
               <a:t>singleton</a:t>
             </a:r>
             <a:r>
-              <a:rPr lang="ja-JP" altLang="en-US" b="1" dirty="0" smtClean="0">
+              <a:rPr lang="ja-JP" altLang="en-US" sz="1800" b="1" dirty="0" smtClean="0">
                 <a:solidFill>
                   <a:srgbClr val="FF0066"/>
                 </a:solidFill>
               </a:rPr>
               <a:t>は</a:t>
             </a:r>
-            <a:endParaRPr lang="en-US" altLang="ja-JP" b="1" dirty="0" smtClean="0">
+            <a:r>
+              <a:rPr lang="en-US" altLang="ja-JP" sz="1800" b="1" dirty="0" smtClean="0">
+                <a:solidFill>
+                  <a:srgbClr val="FF0066"/>
+                </a:solidFill>
+              </a:rPr>
+              <a:t>1</a:t>
+            </a:r>
+            <a:r>
+              <a:rPr lang="ja-JP" altLang="en-US" sz="1800" b="1" dirty="0" err="1" smtClean="0">
+                <a:solidFill>
+                  <a:srgbClr val="FF0066"/>
+                </a:solidFill>
+              </a:rPr>
+              <a:t>つに</a:t>
+            </a:r>
+            <a:r>
+              <a:rPr lang="ja-JP" altLang="en-US" sz="1800" b="1" dirty="0" smtClean="0">
+                <a:solidFill>
+                  <a:srgbClr val="FF0066"/>
+                </a:solidFill>
+              </a:rPr>
+              <a:t>決定されるため、</a:t>
+            </a:r>
+            <a:r>
+              <a:rPr lang="en-US" altLang="ja-JP" sz="1800" b="1" dirty="0" smtClean="0">
+                <a:solidFill>
+                  <a:srgbClr val="FF0066"/>
+                </a:solidFill>
+              </a:rPr>
+              <a:t>obj2</a:t>
+            </a:r>
+            <a:r>
+              <a:rPr lang="ja-JP" altLang="en-US" sz="1800" b="1" dirty="0" smtClean="0">
+                <a:solidFill>
+                  <a:srgbClr val="FF0066"/>
+                </a:solidFill>
+              </a:rPr>
+              <a:t>の中身は</a:t>
+            </a:r>
+            <a:r>
+              <a:rPr lang="en-US" altLang="ja-JP" sz="1800" b="1" dirty="0" smtClean="0">
+                <a:solidFill>
+                  <a:srgbClr val="FF0066"/>
+                </a:solidFill>
+              </a:rPr>
+              <a:t>obj1</a:t>
+            </a:r>
+            <a:r>
+              <a:rPr lang="ja-JP" altLang="en-US" sz="1800" b="1" dirty="0" smtClean="0">
+                <a:solidFill>
+                  <a:srgbClr val="FF0066"/>
+                </a:solidFill>
+              </a:rPr>
+              <a:t>と</a:t>
+            </a:r>
+            <a:endParaRPr lang="en-US" altLang="ja-JP" sz="1800" b="1" dirty="0" smtClean="0">
               <a:solidFill>
                 <a:srgbClr val="FF0066"/>
               </a:solidFill>
@@ -6954,7 +7176,7 @@
               <a:buNone/>
             </a:pPr>
             <a:r>
-              <a:rPr lang="ja-JP" altLang="en-US" b="1" dirty="0">
+              <a:rPr lang="ja-JP" altLang="en-US" sz="1800" b="1" dirty="0">
                 <a:solidFill>
                   <a:srgbClr val="FF0066"/>
                 </a:solidFill>
@@ -6962,74 +7184,14 @@
               <a:t>　</a:t>
             </a:r>
             <a:r>
-              <a:rPr lang="ja-JP" altLang="en-US" b="1" dirty="0" smtClean="0">
+              <a:rPr lang="ja-JP" altLang="en-US" sz="1800" b="1" dirty="0" smtClean="0">
                 <a:solidFill>
                   <a:srgbClr val="FF0066"/>
                 </a:solidFill>
               </a:rPr>
-              <a:t> </a:t>
-            </a:r>
-            <a:r>
-              <a:rPr lang="en-US" altLang="ja-JP" b="1" dirty="0" smtClean="0">
-                <a:solidFill>
-                  <a:srgbClr val="FF0066"/>
-                </a:solidFill>
-              </a:rPr>
-              <a:t>1</a:t>
-            </a:r>
-            <a:r>
-              <a:rPr lang="ja-JP" altLang="en-US" b="1" dirty="0" err="1" smtClean="0">
-                <a:solidFill>
-                  <a:srgbClr val="FF0066"/>
-                </a:solidFill>
-              </a:rPr>
-              <a:t>つに</a:t>
-            </a:r>
-            <a:r>
-              <a:rPr lang="ja-JP" altLang="en-US" b="1" dirty="0" smtClean="0">
-                <a:solidFill>
-                  <a:srgbClr val="FF0066"/>
-                </a:solidFill>
-              </a:rPr>
-              <a:t>決定されるため、</a:t>
-            </a:r>
-            <a:r>
-              <a:rPr lang="en-US" altLang="ja-JP" b="1" dirty="0" smtClean="0">
-                <a:solidFill>
-                  <a:srgbClr val="FF0066"/>
-                </a:solidFill>
-              </a:rPr>
-              <a:t>obj2</a:t>
-            </a:r>
-            <a:r>
-              <a:rPr lang="ja-JP" altLang="en-US" b="1" dirty="0" smtClean="0">
-                <a:solidFill>
-                  <a:srgbClr val="FF0066"/>
-                </a:solidFill>
-              </a:rPr>
-              <a:t>の中身は</a:t>
-            </a:r>
-            <a:r>
-              <a:rPr lang="en-US" altLang="ja-JP" b="1" dirty="0" smtClean="0">
-                <a:solidFill>
-                  <a:srgbClr val="FF0066"/>
-                </a:solidFill>
-              </a:rPr>
-              <a:t>obj1</a:t>
-            </a:r>
-            <a:r>
-              <a:rPr lang="ja-JP" altLang="en-US" b="1" dirty="0" smtClean="0">
-                <a:solidFill>
-                  <a:srgbClr val="FF0066"/>
-                </a:solidFill>
-              </a:rPr>
-              <a:t>と等しくなる</a:t>
-            </a:r>
-            <a:r>
-              <a:rPr lang="ja-JP" altLang="en-US" dirty="0" smtClean="0"/>
-              <a:t>。</a:t>
-            </a:r>
-            <a:endParaRPr kumimoji="1" lang="en-US" altLang="ja-JP" dirty="0" smtClean="0"/>
+              <a:t>等しくなる</a:t>
+            </a:r>
+            <a:endParaRPr kumimoji="1" lang="en-US" altLang="ja-JP" sz="1800" dirty="0" smtClean="0"/>
           </a:p>
         </p:txBody>
       </p:sp>

</xml_diff>